<commit_message>
Committing the poster. Finished 2/3 of it
</commit_message>
<xml_diff>
--- a/APS April 2020 Poster New.pptx
+++ b/APS April 2020 Poster New.pptx
@@ -238,7 +238,7 @@
           <a:p>
             <a:fld id="{71A9164F-6062-4939-9E7C-E788D992CFF1}" type="datetimeFigureOut">
               <a:rPr lang="en-US" smtClean="0"/>
-              <a:t>4/13/2020</a:t>
+              <a:t>4/15/2020</a:t>
             </a:fld>
             <a:endParaRPr lang="en-US"/>
           </a:p>
@@ -725,7 +725,7 @@
           <a:p>
             <a:fld id="{9DC63369-2878-4B93-99A3-771C56153E97}" type="datetimeFigureOut">
               <a:rPr lang="en-US" smtClean="0"/>
-              <a:t>4/13/2020</a:t>
+              <a:t>4/15/2020</a:t>
             </a:fld>
             <a:endParaRPr lang="en-US"/>
           </a:p>
@@ -896,7 +896,7 @@
             <a:fld id="{5DFC66C6-2FA0-5744-8AC7-5AD7F361DA93}" type="datetimeFigureOut">
               <a:rPr lang="en-US" smtClean="0"/>
               <a:pPr/>
-              <a:t>4/13/2020</a:t>
+              <a:t>4/15/2020</a:t>
             </a:fld>
             <a:endParaRPr lang="en-US" dirty="0"/>
           </a:p>
@@ -1078,7 +1078,7 @@
             <a:fld id="{5DFC66C6-2FA0-5744-8AC7-5AD7F361DA93}" type="datetimeFigureOut">
               <a:rPr lang="en-US" smtClean="0"/>
               <a:pPr/>
-              <a:t>4/13/2020</a:t>
+              <a:t>4/15/2020</a:t>
             </a:fld>
             <a:endParaRPr lang="en-US" dirty="0"/>
           </a:p>
@@ -1361,7 +1361,7 @@
             <a:fld id="{5DFC66C6-2FA0-5744-8AC7-5AD7F361DA93}" type="datetimeFigureOut">
               <a:rPr lang="en-US" smtClean="0"/>
               <a:pPr/>
-              <a:t>4/13/2020</a:t>
+              <a:t>4/15/2020</a:t>
             </a:fld>
             <a:endParaRPr lang="en-US" dirty="0"/>
           </a:p>
@@ -1606,7 +1606,7 @@
           <a:p>
             <a:fld id="{9DC63369-2878-4B93-99A3-771C56153E97}" type="datetimeFigureOut">
               <a:rPr lang="en-US" smtClean="0"/>
-              <a:t>4/13/2020</a:t>
+              <a:t>4/15/2020</a:t>
             </a:fld>
             <a:endParaRPr lang="en-US"/>
           </a:p>
@@ -1987,7 +1987,7 @@
             <a:fld id="{5DFC66C6-2FA0-5744-8AC7-5AD7F361DA93}" type="datetimeFigureOut">
               <a:rPr lang="en-US" smtClean="0"/>
               <a:pPr/>
-              <a:t>4/13/2020</a:t>
+              <a:t>4/15/2020</a:t>
             </a:fld>
             <a:endParaRPr lang="en-US" dirty="0"/>
           </a:p>
@@ -2356,7 +2356,7 @@
             <a:fld id="{5DFC66C6-2FA0-5744-8AC7-5AD7F361DA93}" type="datetimeFigureOut">
               <a:rPr lang="en-US" smtClean="0"/>
               <a:pPr/>
-              <a:t>4/13/2020</a:t>
+              <a:t>4/15/2020</a:t>
             </a:fld>
             <a:endParaRPr lang="en-US" dirty="0"/>
           </a:p>
@@ -2476,7 +2476,7 @@
             <a:fld id="{5DFC66C6-2FA0-5744-8AC7-5AD7F361DA93}" type="datetimeFigureOut">
               <a:rPr lang="en-US" smtClean="0"/>
               <a:pPr/>
-              <a:t>4/13/2020</a:t>
+              <a:t>4/15/2020</a:t>
             </a:fld>
             <a:endParaRPr lang="en-US" dirty="0"/>
           </a:p>
@@ -2573,7 +2573,7 @@
             <a:fld id="{5DFC66C6-2FA0-5744-8AC7-5AD7F361DA93}" type="datetimeFigureOut">
               <a:rPr lang="en-US" smtClean="0"/>
               <a:pPr/>
-              <a:t>4/13/2020</a:t>
+              <a:t>4/15/2020</a:t>
             </a:fld>
             <a:endParaRPr lang="en-US" dirty="0"/>
           </a:p>
@@ -2852,7 +2852,7 @@
             <a:fld id="{5DFC66C6-2FA0-5744-8AC7-5AD7F361DA93}" type="datetimeFigureOut">
               <a:rPr lang="en-US" smtClean="0"/>
               <a:pPr/>
-              <a:t>4/13/2020</a:t>
+              <a:t>4/15/2020</a:t>
             </a:fld>
             <a:endParaRPr lang="en-US" dirty="0"/>
           </a:p>
@@ -3111,7 +3111,7 @@
             <a:fld id="{5DFC66C6-2FA0-5744-8AC7-5AD7F361DA93}" type="datetimeFigureOut">
               <a:rPr lang="en-US" smtClean="0"/>
               <a:pPr/>
-              <a:t>4/13/2020</a:t>
+              <a:t>4/15/2020</a:t>
             </a:fld>
             <a:endParaRPr lang="en-US" dirty="0"/>
           </a:p>
@@ -3326,7 +3326,7 @@
             <a:fld id="{5DFC66C6-2FA0-5744-8AC7-5AD7F361DA93}" type="datetimeFigureOut">
               <a:rPr lang="en-US" smtClean="0"/>
               <a:pPr/>
-              <a:t>4/13/2020</a:t>
+              <a:t>4/15/2020</a:t>
             </a:fld>
             <a:endParaRPr lang="en-US" dirty="0"/>
           </a:p>
@@ -4003,16 +4003,16 @@
           <a:p>
             <a:pPr algn="ctr"/>
             <a:r>
-              <a:rPr lang="en-US" sz="6000" b="1">
+              <a:rPr lang="en-US" sz="6000" b="1" dirty="0">
                 <a:solidFill>
                   <a:schemeClr val="bg1"/>
                 </a:solidFill>
                 <a:latin typeface="Tahoma" pitchFamily="-111" charset="0"/>
               </a:rPr>
-              <a:t>Heavy Element Database for the R-process in Neutron Stars</a:t>
-            </a:r>
-            <a:r>
-              <a:rPr lang="en-US" sz="4414" b="1">
+              <a:t>Lanthanide Database for Abundances in Neutron Star Mergers</a:t>
+            </a:r>
+            <a:r>
+              <a:rPr lang="en-US" sz="4414" b="1" dirty="0">
                 <a:solidFill>
                   <a:schemeClr val="bg1"/>
                 </a:solidFill>
@@ -4022,7 +4022,7 @@
 </a:t>
             </a:r>
             <a:r>
-              <a:rPr lang="en-US" sz="2759" b="1">
+              <a:rPr lang="en-US" sz="2759" b="1" dirty="0">
                 <a:solidFill>
                   <a:schemeClr val="bg1"/>
                 </a:solidFill>
@@ -4161,21 +4161,7 @@
                 <a:latin typeface="Times New Roman" panose="02020603050405020304" pitchFamily="18" charset="0"/>
                 <a:cs typeface="Times New Roman" panose="02020603050405020304" pitchFamily="18" charset="0"/>
               </a:rPr>
-              <a:t>Up until now, scientists have figured out where most of the elements of the periodic table originate. Big Bang Nucleosynthesis, or the synthesis of the elements specifically after the Big Bang, involved the creation of helium and lithium atoms through hydrogen atoms. In the 20</a:t>
-            </a:r>
-            <a:r>
-              <a:rPr lang="en-US" sz="2000" baseline="30000" dirty="0">
-                <a:latin typeface="Times New Roman" panose="02020603050405020304" pitchFamily="18" charset="0"/>
-                <a:cs typeface="Times New Roman" panose="02020603050405020304" pitchFamily="18" charset="0"/>
-              </a:rPr>
-              <a:t>th</a:t>
-            </a:r>
-            <a:r>
-              <a:rPr lang="en-US" sz="3600" baseline="-25000" dirty="0">
-                <a:latin typeface="Times New Roman" panose="02020603050405020304" pitchFamily="18" charset="0"/>
-                <a:cs typeface="Times New Roman" panose="02020603050405020304" pitchFamily="18" charset="0"/>
-              </a:rPr>
-              <a:t> century, nuclear fusion in the cores of stars became the prime process used to form the elements up to iron. Supernovae, or the violent explosions marking the deaths of these stars, formed quite a few of the heavier elements through the rapid neutron capture process, or r-process. In this, atoms capture neutrons in a neutron-rich environment like a supernovae, creating a radioactive isotope that later decays into stable ones. However, a new class of astronomical event seems to be the source of the remaining r-process elements: neutron star mergers. These neutron star mergers(NSMs) are often the most neutron-rich events in the universe, so they are necessary for the formation of the rather heavy elements, most notably the lanthanides and actinides. Understanding all the details to this event will uncover why there is such a large abundance of elements like gold and uranium. In fact, there has been two confirmed NSMs, most notably GW170817 in 2017. This merger also had an associated kilonova, the optical transient. By studying its spectra, one can deduce which elements were created in the merger event as the radioactive and energetic atoms release light that all contribute to this observed spectra.</a:t>
+              <a:t>Big Bang Nucleosynthesis, or the synthesis of the elements specifically after the Big Bang, involved the creation of helium and lithium atoms through hydrogen atoms. Nuclear fusion in the cores of stars became the prime process used to form the elements up to iron. Supernovae, or the violent explosions marking the deaths of these stars, formed quite a few of the heavier elements through the rapid neutron capture process, or r-process. Atoms capture neutrons in a neutron-rich environment, creating a radioactive isotope that later decays into stable ones. However, a new class of astronomical event seems to be the source of the remaining r-process elements: neutron star mergers. These neutron star mergers(NSMs) are often the most neutron-rich events in the universe, so they are necessary for the formation of the rather heavy elements, most notably the lanthanides and actinides. Understanding all the details to this event will uncover why there is such a large abundance of elements like gold and uranium. There has been two confirmed NSMs, most notably GW170817 in 2017. This merger also had an associated kilonova, the optical transient. By studying its spectra, one can deduce which elements were created in the merger event as the radioactive and energetic atoms release light that all contribute to this observed spectra.</a:t>
             </a:r>
           </a:p>
           <a:p>
@@ -4303,7 +4289,7 @@
                 <a:latin typeface="Times New Roman" panose="02020603050405020304" pitchFamily="18" charset="0"/>
                 <a:cs typeface="Times New Roman" panose="02020603050405020304" pitchFamily="18" charset="0"/>
               </a:rPr>
-              <a:t>Why We Study the Event</a:t>
+              <a:t>Motivation</a:t>
             </a:r>
             <a:endParaRPr lang="en-US" sz="3600" baseline="-25000" dirty="0">
               <a:latin typeface="Times New Roman" panose="02020603050405020304" pitchFamily="18" charset="0"/>
@@ -4744,7 +4730,7 @@
         </p:blipFill>
         <p:spPr>
           <a:xfrm>
-            <a:off x="171504" y="19828978"/>
+            <a:off x="47113" y="19416023"/>
             <a:ext cx="6100452" cy="4788871"/>
           </a:xfrm>
           <a:prstGeom prst="rect">
@@ -4773,7 +4759,7 @@
         </p:blipFill>
         <p:spPr>
           <a:xfrm>
-            <a:off x="6709447" y="19978276"/>
+            <a:off x="6687318" y="19565321"/>
             <a:ext cx="5663213" cy="4639573"/>
           </a:xfrm>
           <a:prstGeom prst="rect">
@@ -4795,7 +4781,7 @@
         </p:nvSpPr>
         <p:spPr>
           <a:xfrm>
-            <a:off x="1229496" y="24918641"/>
+            <a:off x="1012238" y="24593833"/>
             <a:ext cx="5042460" cy="738664"/>
           </a:xfrm>
           <a:prstGeom prst="rect">
@@ -4833,7 +4819,7 @@
         </p:nvSpPr>
         <p:spPr>
           <a:xfrm>
-            <a:off x="7019823" y="24895557"/>
+            <a:off x="7019823" y="24581840"/>
             <a:ext cx="5042460" cy="738664"/>
           </a:xfrm>
           <a:prstGeom prst="rect">
@@ -4900,7 +4886,7 @@
         <p:spPr>
           <a:xfrm>
             <a:off x="13036553" y="2880216"/>
-            <a:ext cx="12449687" cy="27976890"/>
+            <a:ext cx="12449687" cy="23360241"/>
           </a:xfrm>
           <a:prstGeom prst="rect">
             <a:avLst/>
@@ -4935,104 +4921,8 @@
                 <a:latin typeface="Times New Roman" panose="02020603050405020304" pitchFamily="18" charset="0"/>
                 <a:cs typeface="Times New Roman" panose="02020603050405020304" pitchFamily="18" charset="0"/>
               </a:rPr>
-              <a:t>Considering this project ties Atomic Physics with Nuclear Astrophysics, it’s become necessary to compile an extensive dataset of the amount of known energy levels for each lanthanide and actinide. Knowing the amount is important since one can figure out the ionization states and their abundances in the merger material but not about each energy level contributing to the overall spectra. We gathered this data through the National Institute of Standards and Technology(NIST) atomic spectra database. Literature searches were also conducted to see how various researchers predicted the kilonova spectra despite the lack of energy level information present. While two versions of spectra approximations existed, Sobolov line expansion and line-smearing, we figured studying the abundances directly would yield a better understanding of the distribution for the energy levels.</a:t>
-            </a:r>
-          </a:p>
-          <a:p>
-            <a:endParaRPr lang="en-US" sz="3600" baseline="-25000" dirty="0">
-              <a:latin typeface="Times New Roman" panose="02020603050405020304" pitchFamily="18" charset="0"/>
-              <a:cs typeface="Times New Roman" panose="02020603050405020304" pitchFamily="18" charset="0"/>
-            </a:endParaRPr>
-          </a:p>
-          <a:p>
-            <a:endParaRPr lang="en-US" sz="3600" baseline="-25000" dirty="0">
-              <a:latin typeface="Times New Roman" panose="02020603050405020304" pitchFamily="18" charset="0"/>
-              <a:cs typeface="Times New Roman" panose="02020603050405020304" pitchFamily="18" charset="0"/>
-            </a:endParaRPr>
-          </a:p>
-          <a:p>
-            <a:endParaRPr lang="en-US" sz="3600" baseline="-25000" dirty="0">
-              <a:latin typeface="Times New Roman" panose="02020603050405020304" pitchFamily="18" charset="0"/>
-              <a:cs typeface="Times New Roman" panose="02020603050405020304" pitchFamily="18" charset="0"/>
-            </a:endParaRPr>
-          </a:p>
-          <a:p>
-            <a:endParaRPr lang="en-US" sz="3600" baseline="-25000" dirty="0">
-              <a:latin typeface="Times New Roman" panose="02020603050405020304" pitchFamily="18" charset="0"/>
-              <a:cs typeface="Times New Roman" panose="02020603050405020304" pitchFamily="18" charset="0"/>
-            </a:endParaRPr>
-          </a:p>
-          <a:p>
-            <a:endParaRPr lang="en-US" sz="3600" baseline="-25000" dirty="0">
-              <a:latin typeface="Times New Roman" panose="02020603050405020304" pitchFamily="18" charset="0"/>
-              <a:cs typeface="Times New Roman" panose="02020603050405020304" pitchFamily="18" charset="0"/>
-            </a:endParaRPr>
-          </a:p>
-          <a:p>
-            <a:endParaRPr lang="en-US" sz="3600" baseline="-25000" dirty="0">
-              <a:latin typeface="Times New Roman" panose="02020603050405020304" pitchFamily="18" charset="0"/>
-              <a:cs typeface="Times New Roman" panose="02020603050405020304" pitchFamily="18" charset="0"/>
-            </a:endParaRPr>
-          </a:p>
-          <a:p>
-            <a:endParaRPr lang="en-US" sz="3600" baseline="-25000" dirty="0">
-              <a:latin typeface="Times New Roman" panose="02020603050405020304" pitchFamily="18" charset="0"/>
-              <a:cs typeface="Times New Roman" panose="02020603050405020304" pitchFamily="18" charset="0"/>
-            </a:endParaRPr>
-          </a:p>
-          <a:p>
-            <a:endParaRPr lang="en-US" sz="3600" baseline="-25000" dirty="0">
-              <a:latin typeface="Times New Roman" panose="02020603050405020304" pitchFamily="18" charset="0"/>
-              <a:cs typeface="Times New Roman" panose="02020603050405020304" pitchFamily="18" charset="0"/>
-            </a:endParaRPr>
-          </a:p>
-          <a:p>
-            <a:endParaRPr lang="en-US" sz="3600" baseline="-25000" dirty="0">
-              <a:latin typeface="Times New Roman" panose="02020603050405020304" pitchFamily="18" charset="0"/>
-              <a:cs typeface="Times New Roman" panose="02020603050405020304" pitchFamily="18" charset="0"/>
-            </a:endParaRPr>
-          </a:p>
-          <a:p>
-            <a:endParaRPr lang="en-US" sz="3600" baseline="-25000" dirty="0">
-              <a:latin typeface="Times New Roman" panose="02020603050405020304" pitchFamily="18" charset="0"/>
-              <a:cs typeface="Times New Roman" panose="02020603050405020304" pitchFamily="18" charset="0"/>
-            </a:endParaRPr>
-          </a:p>
-          <a:p>
-            <a:endParaRPr lang="en-US" sz="3600" baseline="-25000" dirty="0">
-              <a:latin typeface="Times New Roman" panose="02020603050405020304" pitchFamily="18" charset="0"/>
-              <a:cs typeface="Times New Roman" panose="02020603050405020304" pitchFamily="18" charset="0"/>
-            </a:endParaRPr>
-          </a:p>
-          <a:p>
-            <a:endParaRPr lang="en-US" sz="3600" baseline="-25000" dirty="0">
-              <a:latin typeface="Times New Roman" panose="02020603050405020304" pitchFamily="18" charset="0"/>
-              <a:cs typeface="Times New Roman" panose="02020603050405020304" pitchFamily="18" charset="0"/>
-            </a:endParaRPr>
-          </a:p>
-          <a:p>
-            <a:endParaRPr lang="en-US" sz="3600" baseline="-25000" dirty="0">
-              <a:latin typeface="Times New Roman" panose="02020603050405020304" pitchFamily="18" charset="0"/>
-              <a:cs typeface="Times New Roman" panose="02020603050405020304" pitchFamily="18" charset="0"/>
-            </a:endParaRPr>
-          </a:p>
-          <a:p>
-            <a:endParaRPr lang="en-US" sz="3600" baseline="-25000" dirty="0">
-              <a:latin typeface="Times New Roman" panose="02020603050405020304" pitchFamily="18" charset="0"/>
-              <a:cs typeface="Times New Roman" panose="02020603050405020304" pitchFamily="18" charset="0"/>
-            </a:endParaRPr>
-          </a:p>
-          <a:p>
-            <a:endParaRPr lang="en-US" sz="3600" baseline="-25000" dirty="0">
-              <a:latin typeface="Times New Roman" panose="02020603050405020304" pitchFamily="18" charset="0"/>
-              <a:cs typeface="Times New Roman" panose="02020603050405020304" pitchFamily="18" charset="0"/>
-            </a:endParaRPr>
-          </a:p>
-          <a:p>
-            <a:endParaRPr lang="en-US" sz="3600" baseline="-25000" dirty="0">
-              <a:latin typeface="Times New Roman" panose="02020603050405020304" pitchFamily="18" charset="0"/>
-              <a:cs typeface="Times New Roman" panose="02020603050405020304" pitchFamily="18" charset="0"/>
-            </a:endParaRPr>
+              <a:t>Skynet, a nuclear reaction network code developed by Jonas Lippuner and Luke Roberts, was utilized to output all the elemental abundances for hydrogen all the way to elements beyond oganesson. The Saha equation is utilized here since there is a useful relationship between the nth and (n+1)th ionization states. However, since we didn't ‘t have access to any specific ionization state or any free electron fraction values across time, we developed numerous equations relating the elemental abundances to each ionization state abundance. Using these equations, we built three abundance functions: the first used only one element, samarium, to calculate the abundances across all 63 ionization states while the second involved two elements, samarium and europium. The final code simply requires the user to input any number of elements they want and which ones to consider.  An important idea to note is that the abundance calculation code only utilizes data for elements 1 to 103 since we are focused on the lanthanides and actinides only. Also, the NIST table has numerous gaps in their database of ionization potentials for any element heavier than lawrencium. </a:t>
+            </a:r>
           </a:p>
           <a:p>
             <a:endParaRPr lang="en-US" sz="3600" baseline="-25000" dirty="0">
@@ -5042,6 +4932,137 @@
               <a:latin typeface="Times New Roman" panose="02020603050405020304" pitchFamily="18" charset="0"/>
               <a:cs typeface="Times New Roman" panose="02020603050405020304" pitchFamily="18" charset="0"/>
             </a:endParaRPr>
+          </a:p>
+          <a:p>
+            <a:endParaRPr lang="en-US" sz="3600" baseline="-25000" dirty="0">
+              <a:solidFill>
+                <a:srgbClr val="FF0000"/>
+              </a:solidFill>
+              <a:latin typeface="Times New Roman" panose="02020603050405020304" pitchFamily="18" charset="0"/>
+              <a:cs typeface="Times New Roman" panose="02020603050405020304" pitchFamily="18" charset="0"/>
+            </a:endParaRPr>
+          </a:p>
+          <a:p>
+            <a:endParaRPr lang="en-US" sz="3600" baseline="-25000" dirty="0">
+              <a:solidFill>
+                <a:srgbClr val="FF0000"/>
+              </a:solidFill>
+              <a:latin typeface="Times New Roman" panose="02020603050405020304" pitchFamily="18" charset="0"/>
+              <a:cs typeface="Times New Roman" panose="02020603050405020304" pitchFamily="18" charset="0"/>
+            </a:endParaRPr>
+          </a:p>
+          <a:p>
+            <a:endParaRPr lang="en-US" sz="3600" baseline="-25000" dirty="0">
+              <a:solidFill>
+                <a:srgbClr val="FF0000"/>
+              </a:solidFill>
+              <a:latin typeface="Times New Roman" panose="02020603050405020304" pitchFamily="18" charset="0"/>
+              <a:cs typeface="Times New Roman" panose="02020603050405020304" pitchFamily="18" charset="0"/>
+            </a:endParaRPr>
+          </a:p>
+          <a:p>
+            <a:endParaRPr lang="en-US" sz="3600" baseline="-25000" dirty="0">
+              <a:solidFill>
+                <a:srgbClr val="FF0000"/>
+              </a:solidFill>
+              <a:latin typeface="Times New Roman" panose="02020603050405020304" pitchFamily="18" charset="0"/>
+              <a:cs typeface="Times New Roman" panose="02020603050405020304" pitchFamily="18" charset="0"/>
+            </a:endParaRPr>
+          </a:p>
+          <a:p>
+            <a:pPr algn="ctr"/>
+            <a:endParaRPr lang="en-US" sz="3600" baseline="-25000" dirty="0">
+              <a:latin typeface="Times New Roman" panose="02020603050405020304" pitchFamily="18" charset="0"/>
+              <a:cs typeface="Times New Roman" panose="02020603050405020304" pitchFamily="18" charset="0"/>
+            </a:endParaRPr>
+          </a:p>
+          <a:p>
+            <a:pPr marL="571500" indent="-571500">
+              <a:buFont typeface="Arial" panose="020B0604020202020204" pitchFamily="34" charset="0"/>
+              <a:buChar char="•"/>
+            </a:pPr>
+            <a:endParaRPr lang="en-US" sz="3600" baseline="-25000" dirty="0">
+              <a:latin typeface="Times New Roman" panose="02020603050405020304" pitchFamily="18" charset="0"/>
+              <a:cs typeface="Times New Roman" panose="02020603050405020304" pitchFamily="18" charset="0"/>
+            </a:endParaRPr>
+          </a:p>
+          <a:p>
+            <a:endParaRPr lang="en-US" sz="3600" baseline="-25000" dirty="0">
+              <a:latin typeface="Times New Roman" panose="02020603050405020304" pitchFamily="18" charset="0"/>
+              <a:cs typeface="Times New Roman" panose="02020603050405020304" pitchFamily="18" charset="0"/>
+            </a:endParaRPr>
+          </a:p>
+          <a:p>
+            <a:endParaRPr lang="en-US" sz="3600" baseline="-25000" dirty="0">
+              <a:latin typeface="Times New Roman" panose="02020603050405020304" pitchFamily="18" charset="0"/>
+              <a:cs typeface="Times New Roman" panose="02020603050405020304" pitchFamily="18" charset="0"/>
+            </a:endParaRPr>
+          </a:p>
+          <a:p>
+            <a:pPr marL="571500" indent="-571500">
+              <a:buFont typeface="Arial" panose="020B0604020202020204" pitchFamily="34" charset="0"/>
+              <a:buChar char="•"/>
+            </a:pPr>
+            <a:endParaRPr lang="en-US" sz="3600" baseline="-25000" dirty="0">
+              <a:latin typeface="Times New Roman" panose="02020603050405020304" pitchFamily="18" charset="0"/>
+              <a:cs typeface="Times New Roman" panose="02020603050405020304" pitchFamily="18" charset="0"/>
+            </a:endParaRPr>
+          </a:p>
+          <a:p>
+            <a:pPr marL="571500" indent="-571500">
+              <a:buFont typeface="Arial" panose="020B0604020202020204" pitchFamily="34" charset="0"/>
+              <a:buChar char="•"/>
+            </a:pPr>
+            <a:endParaRPr lang="en-US" sz="3600" baseline="-25000" dirty="0">
+              <a:latin typeface="Times New Roman" panose="02020603050405020304" pitchFamily="18" charset="0"/>
+              <a:cs typeface="Times New Roman" panose="02020603050405020304" pitchFamily="18" charset="0"/>
+            </a:endParaRPr>
+          </a:p>
+          <a:p>
+            <a:pPr marL="571500" indent="-571500">
+              <a:buFont typeface="Arial" panose="020B0604020202020204" pitchFamily="34" charset="0"/>
+              <a:buChar char="•"/>
+            </a:pPr>
+            <a:endParaRPr lang="en-US" sz="3600" baseline="-25000" dirty="0">
+              <a:latin typeface="Times New Roman" panose="02020603050405020304" pitchFamily="18" charset="0"/>
+              <a:cs typeface="Times New Roman" panose="02020603050405020304" pitchFamily="18" charset="0"/>
+            </a:endParaRPr>
+          </a:p>
+          <a:p>
+            <a:pPr algn="ctr"/>
+            <a:endParaRPr lang="en-US" sz="3600" u="sng" baseline="-25000" dirty="0">
+              <a:latin typeface="Times New Roman" panose="02020603050405020304" pitchFamily="18" charset="0"/>
+              <a:cs typeface="Times New Roman" panose="02020603050405020304" pitchFamily="18" charset="0"/>
+            </a:endParaRPr>
+          </a:p>
+          <a:p>
+            <a:pPr marL="571500" indent="-571500">
+              <a:buFont typeface="Arial" panose="020B0604020202020204" pitchFamily="34" charset="0"/>
+              <a:buChar char="•"/>
+            </a:pPr>
+            <a:endParaRPr lang="en-US" sz="3600" baseline="-25000" dirty="0">
+              <a:latin typeface="Times New Roman" panose="02020603050405020304" pitchFamily="18" charset="0"/>
+              <a:cs typeface="Times New Roman" panose="02020603050405020304" pitchFamily="18" charset="0"/>
+            </a:endParaRPr>
+          </a:p>
+          <a:p>
+            <a:endParaRPr lang="en-US" sz="3600" baseline="-25000" dirty="0">
+              <a:latin typeface="Times New Roman" panose="02020603050405020304" pitchFamily="18" charset="0"/>
+              <a:cs typeface="Times New Roman" panose="02020603050405020304" pitchFamily="18" charset="0"/>
+            </a:endParaRPr>
+          </a:p>
+          <a:p>
+            <a:pPr algn="ctr"/>
+            <a:r>
+              <a:rPr lang="en-US" sz="5400" b="1" baseline="-25000" dirty="0">
+                <a:solidFill>
+                  <a:srgbClr val="FF0000"/>
+                </a:solidFill>
+                <a:latin typeface="Times New Roman" panose="02020603050405020304" pitchFamily="18" charset="0"/>
+                <a:cs typeface="Times New Roman" panose="02020603050405020304" pitchFamily="18" charset="0"/>
+              </a:rPr>
+              <a:t>Results and Analysis</a:t>
+            </a:r>
           </a:p>
           <a:p>
             <a:r>
@@ -5049,60 +5070,78 @@
                 <a:latin typeface="Times New Roman" panose="02020603050405020304" pitchFamily="18" charset="0"/>
                 <a:cs typeface="Times New Roman" panose="02020603050405020304" pitchFamily="18" charset="0"/>
               </a:rPr>
-              <a:t>Skynet, a nuclear reaction network code developed by Jonas Lippuner and Luke Roberts, was utilized to output all the elemental abundances for hydrogen all the way to elements beyond oganesson. The Saha equation is utilized here since there is a useful relationship between the nth and (n+1)th ionization states. However, since we didn't ‘t have access to any specific ionization state or any free electron fraction values across time, we developed numerous equations relating the elemental abundances to each ionization state abundance. Using these equations, we built three abundance functions: the first used only one element, samarium, to calculate the abundances across all 63 ionization states while the second involved two elements, samarium and europium. The final code simply requires the user to input any number of elements they want and which ones to consider.  An important idea to note is that the abundance calculation code only utilizes data for elements 1 to 103 since we are focused on the lanthanides and actinides only. Also, the NIST table has numerous gaps in their database of ionization potentials for any element heavier than lawrencium,. </a:t>
-            </a:r>
-          </a:p>
-          <a:p>
-            <a:endParaRPr lang="en-US" sz="3600" baseline="-25000" dirty="0">
-              <a:solidFill>
-                <a:srgbClr val="FF0000"/>
-              </a:solidFill>
-              <a:latin typeface="Times New Roman" panose="02020603050405020304" pitchFamily="18" charset="0"/>
-              <a:cs typeface="Times New Roman" panose="02020603050405020304" pitchFamily="18" charset="0"/>
-            </a:endParaRPr>
-          </a:p>
-          <a:p>
-            <a:endParaRPr lang="en-US" sz="3600" baseline="-25000" dirty="0">
-              <a:solidFill>
-                <a:srgbClr val="FF0000"/>
-              </a:solidFill>
-              <a:latin typeface="Times New Roman" panose="02020603050405020304" pitchFamily="18" charset="0"/>
-              <a:cs typeface="Times New Roman" panose="02020603050405020304" pitchFamily="18" charset="0"/>
-            </a:endParaRPr>
-          </a:p>
-          <a:p>
-            <a:endParaRPr lang="en-US" sz="3600" baseline="-25000" dirty="0">
-              <a:solidFill>
-                <a:srgbClr val="FF0000"/>
-              </a:solidFill>
-              <a:latin typeface="Times New Roman" panose="02020603050405020304" pitchFamily="18" charset="0"/>
-              <a:cs typeface="Times New Roman" panose="02020603050405020304" pitchFamily="18" charset="0"/>
-            </a:endParaRPr>
-          </a:p>
-          <a:p>
-            <a:endParaRPr lang="en-US" sz="3600" baseline="-25000" dirty="0">
-              <a:solidFill>
-                <a:srgbClr val="FF0000"/>
-              </a:solidFill>
-              <a:latin typeface="Times New Roman" panose="02020603050405020304" pitchFamily="18" charset="0"/>
-              <a:cs typeface="Times New Roman" panose="02020603050405020304" pitchFamily="18" charset="0"/>
-            </a:endParaRPr>
-          </a:p>
-          <a:p>
-            <a:endParaRPr lang="en-US" sz="3600" baseline="-25000" dirty="0">
-              <a:solidFill>
-                <a:srgbClr val="FF0000"/>
-              </a:solidFill>
-              <a:latin typeface="Times New Roman" panose="02020603050405020304" pitchFamily="18" charset="0"/>
-              <a:cs typeface="Times New Roman" panose="02020603050405020304" pitchFamily="18" charset="0"/>
-            </a:endParaRPr>
-          </a:p>
-          <a:p>
-            <a:pPr algn="ctr"/>
-            <a:endParaRPr lang="en-US" sz="3600" baseline="-25000" dirty="0">
-              <a:latin typeface="Times New Roman" panose="02020603050405020304" pitchFamily="18" charset="0"/>
-              <a:cs typeface="Times New Roman" panose="02020603050405020304" pitchFamily="18" charset="0"/>
-            </a:endParaRPr>
+              <a:t>Our calculations yielded abundances of all ionization states for all elements between Hydrogen and Lawrencium inclusive. For all elements, the abundances for late times after approximately 10</a:t>
+            </a:r>
+            <a:r>
+              <a:rPr lang="en-US" sz="2200" dirty="0">
+                <a:latin typeface="Times New Roman" panose="02020603050405020304" pitchFamily="18" charset="0"/>
+                <a:cs typeface="Times New Roman" panose="02020603050405020304" pitchFamily="18" charset="0"/>
+              </a:rPr>
+              <a:t>-4</a:t>
+            </a:r>
+            <a:r>
+              <a:rPr lang="en-US" sz="2200" baseline="-25000" dirty="0">
+                <a:latin typeface="Times New Roman" panose="02020603050405020304" pitchFamily="18" charset="0"/>
+                <a:cs typeface="Times New Roman" panose="02020603050405020304" pitchFamily="18" charset="0"/>
+              </a:rPr>
+              <a:t> </a:t>
+            </a:r>
+            <a:r>
+              <a:rPr lang="en-US" sz="3600" baseline="-25000" dirty="0">
+                <a:latin typeface="Times New Roman" panose="02020603050405020304" pitchFamily="18" charset="0"/>
+                <a:cs typeface="Times New Roman" panose="02020603050405020304" pitchFamily="18" charset="0"/>
+              </a:rPr>
+              <a:t>sec or below 10</a:t>
+            </a:r>
+            <a:r>
+              <a:rPr lang="en-US" sz="2400" baseline="30000" dirty="0">
+                <a:latin typeface="Times New Roman" panose="02020603050405020304" pitchFamily="18" charset="0"/>
+                <a:cs typeface="Times New Roman" panose="02020603050405020304" pitchFamily="18" charset="0"/>
+              </a:rPr>
+              <a:t>1</a:t>
+            </a:r>
+            <a:r>
+              <a:rPr lang="en-US" sz="2400" baseline="-25000" dirty="0">
+                <a:latin typeface="Times New Roman" panose="02020603050405020304" pitchFamily="18" charset="0"/>
+                <a:cs typeface="Times New Roman" panose="02020603050405020304" pitchFamily="18" charset="0"/>
+              </a:rPr>
+              <a:t> </a:t>
+            </a:r>
+            <a:r>
+              <a:rPr lang="en-US" sz="3600" baseline="-25000" dirty="0">
+                <a:latin typeface="Times New Roman" panose="02020603050405020304" pitchFamily="18" charset="0"/>
+                <a:cs typeface="Times New Roman" panose="02020603050405020304" pitchFamily="18" charset="0"/>
+              </a:rPr>
+              <a:t>eV are all 0 besides the charge neutral state. For early times, so for temperatures larger than 10</a:t>
+            </a:r>
+            <a:r>
+              <a:rPr lang="en-US" sz="2200" dirty="0">
+                <a:latin typeface="Times New Roman" panose="02020603050405020304" pitchFamily="18" charset="0"/>
+                <a:cs typeface="Times New Roman" panose="02020603050405020304" pitchFamily="18" charset="0"/>
+              </a:rPr>
+              <a:t>4</a:t>
+            </a:r>
+            <a:r>
+              <a:rPr lang="en-US" sz="3600" baseline="-25000" dirty="0">
+                <a:latin typeface="Times New Roman" panose="02020603050405020304" pitchFamily="18" charset="0"/>
+                <a:cs typeface="Times New Roman" panose="02020603050405020304" pitchFamily="18" charset="0"/>
+              </a:rPr>
+              <a:t> eV or before 10</a:t>
+            </a:r>
+            <a:r>
+              <a:rPr lang="en-US" sz="2200" dirty="0">
+                <a:latin typeface="Times New Roman" panose="02020603050405020304" pitchFamily="18" charset="0"/>
+                <a:cs typeface="Times New Roman" panose="02020603050405020304" pitchFamily="18" charset="0"/>
+              </a:rPr>
+              <a:t>-2 </a:t>
+            </a:r>
+            <a:r>
+              <a:rPr lang="en-US" sz="3600" baseline="-25000" dirty="0">
+                <a:latin typeface="Times New Roman" panose="02020603050405020304" pitchFamily="18" charset="0"/>
+                <a:cs typeface="Times New Roman" panose="02020603050405020304" pitchFamily="18" charset="0"/>
+              </a:rPr>
+              <a:t>sec, the abundances for most ionization states of any element are 0 except for the much more energetic charge states and the fully ionized ones. Note that all the abundances should be 0 besides the fully ionized one at early times but we did not account for electron degeneracy in the mixture. The free and bound electron fractions are calculated independent to Skynet output and contribute to the trends of the total electron fraction. The electron fraction is one of the important aspects of the Saha equation since it is an indicator of how the electrons are distributed in the medium. It affects how abundant certain charge states can be. All the elements’ charge state abundances follow the same pattern: as the energy of the system decreases, a given charge state becomes less dominant at the same time the lower charge states become significant, thus producing these peaks of the abundances. In fact, the crossing where the dominant species changes is approximately where the transition energy occurs. </a:t>
+            </a:r>
           </a:p>
           <a:p>
             <a:pPr marL="571500" indent="-571500">
@@ -5115,18 +5154,6 @@
             </a:endParaRPr>
           </a:p>
           <a:p>
-            <a:endParaRPr lang="en-US" sz="3600" baseline="-25000" dirty="0">
-              <a:latin typeface="Times New Roman" panose="02020603050405020304" pitchFamily="18" charset="0"/>
-              <a:cs typeface="Times New Roman" panose="02020603050405020304" pitchFamily="18" charset="0"/>
-            </a:endParaRPr>
-          </a:p>
-          <a:p>
-            <a:endParaRPr lang="en-US" sz="3600" baseline="-25000" dirty="0">
-              <a:latin typeface="Times New Roman" panose="02020603050405020304" pitchFamily="18" charset="0"/>
-              <a:cs typeface="Times New Roman" panose="02020603050405020304" pitchFamily="18" charset="0"/>
-            </a:endParaRPr>
-          </a:p>
-          <a:p>
             <a:pPr marL="571500" indent="-571500">
               <a:buFont typeface="Arial" panose="020B0604020202020204" pitchFamily="34" charset="0"/>
               <a:buChar char="•"/>
@@ -5157,13 +5184,6 @@
             </a:endParaRPr>
           </a:p>
           <a:p>
-            <a:pPr algn="ctr"/>
-            <a:endParaRPr lang="en-US" sz="3600" u="sng" baseline="-25000" dirty="0">
-              <a:latin typeface="Times New Roman" panose="02020603050405020304" pitchFamily="18" charset="0"/>
-              <a:cs typeface="Times New Roman" panose="02020603050405020304" pitchFamily="18" charset="0"/>
-            </a:endParaRPr>
-          </a:p>
-          <a:p>
             <a:pPr marL="571500" indent="-571500">
               <a:buFont typeface="Arial" panose="020B0604020202020204" pitchFamily="34" charset="0"/>
               <a:buChar char="•"/>
@@ -5234,6 +5254,25 @@
             </a:endParaRPr>
           </a:p>
           <a:p>
+            <a:endParaRPr lang="en-US" sz="3600" baseline="-25000" dirty="0">
+              <a:latin typeface="Times New Roman" panose="02020603050405020304" pitchFamily="18" charset="0"/>
+              <a:cs typeface="Times New Roman" panose="02020603050405020304" pitchFamily="18" charset="0"/>
+            </a:endParaRPr>
+          </a:p>
+          <a:p>
+            <a:endParaRPr lang="en-US" sz="3600" baseline="-25000" dirty="0">
+              <a:latin typeface="Times New Roman" panose="02020603050405020304" pitchFamily="18" charset="0"/>
+              <a:cs typeface="Times New Roman" panose="02020603050405020304" pitchFamily="18" charset="0"/>
+            </a:endParaRPr>
+          </a:p>
+          <a:p>
+            <a:pPr algn="ctr"/>
+            <a:endParaRPr lang="en-US" sz="3600" baseline="-25000" dirty="0">
+              <a:latin typeface="Times New Roman" panose="02020603050405020304" pitchFamily="18" charset="0"/>
+              <a:cs typeface="Times New Roman" panose="02020603050405020304" pitchFamily="18" charset="0"/>
+            </a:endParaRPr>
+          </a:p>
+          <a:p>
             <a:pPr marL="571500" indent="-571500">
               <a:buFont typeface="Arial" panose="020B0604020202020204" pitchFamily="34" charset="0"/>
               <a:buChar char="•"/>
@@ -5263,205 +5302,8 @@
               <a:cs typeface="Times New Roman" panose="02020603050405020304" pitchFamily="18" charset="0"/>
             </a:endParaRPr>
           </a:p>
-          <a:p>
-            <a:pPr marL="571500" indent="-571500">
-              <a:buFont typeface="Arial" panose="020B0604020202020204" pitchFamily="34" charset="0"/>
-              <a:buChar char="•"/>
-            </a:pPr>
-            <a:endParaRPr lang="en-US" sz="3600" baseline="-25000" dirty="0">
-              <a:latin typeface="Times New Roman" panose="02020603050405020304" pitchFamily="18" charset="0"/>
-              <a:cs typeface="Times New Roman" panose="02020603050405020304" pitchFamily="18" charset="0"/>
-            </a:endParaRPr>
-          </a:p>
-          <a:p>
-            <a:pPr marL="571500" indent="-571500">
-              <a:buFont typeface="Arial" panose="020B0604020202020204" pitchFamily="34" charset="0"/>
-              <a:buChar char="•"/>
-            </a:pPr>
-            <a:endParaRPr lang="en-US" sz="3600" baseline="-25000" dirty="0">
-              <a:latin typeface="Times New Roman" panose="02020603050405020304" pitchFamily="18" charset="0"/>
-              <a:cs typeface="Times New Roman" panose="02020603050405020304" pitchFamily="18" charset="0"/>
-            </a:endParaRPr>
-          </a:p>
-          <a:p>
-            <a:pPr marL="571500" indent="-571500">
-              <a:buFont typeface="Arial" panose="020B0604020202020204" pitchFamily="34" charset="0"/>
-              <a:buChar char="•"/>
-            </a:pPr>
-            <a:endParaRPr lang="en-US" sz="3600" baseline="-25000" dirty="0">
-              <a:latin typeface="Times New Roman" panose="02020603050405020304" pitchFamily="18" charset="0"/>
-              <a:cs typeface="Times New Roman" panose="02020603050405020304" pitchFamily="18" charset="0"/>
-            </a:endParaRPr>
-          </a:p>
-          <a:p>
-            <a:pPr marL="571500" indent="-571500">
-              <a:buFont typeface="Arial" panose="020B0604020202020204" pitchFamily="34" charset="0"/>
-              <a:buChar char="•"/>
-            </a:pPr>
-            <a:endParaRPr lang="en-US" sz="3600" baseline="-25000" dirty="0">
-              <a:latin typeface="Times New Roman" panose="02020603050405020304" pitchFamily="18" charset="0"/>
-              <a:cs typeface="Times New Roman" panose="02020603050405020304" pitchFamily="18" charset="0"/>
-            </a:endParaRPr>
-          </a:p>
-          <a:p>
-            <a:pPr marL="571500" indent="-571500">
-              <a:buFont typeface="Arial" panose="020B0604020202020204" pitchFamily="34" charset="0"/>
-              <a:buChar char="•"/>
-            </a:pPr>
-            <a:endParaRPr lang="en-US" sz="3600" baseline="-25000" dirty="0">
-              <a:latin typeface="Times New Roman" panose="02020603050405020304" pitchFamily="18" charset="0"/>
-              <a:cs typeface="Times New Roman" panose="02020603050405020304" pitchFamily="18" charset="0"/>
-            </a:endParaRPr>
-          </a:p>
-          <a:p>
-            <a:endParaRPr lang="en-US" sz="3600" baseline="-25000" dirty="0">
-              <a:latin typeface="Times New Roman" panose="02020603050405020304" pitchFamily="18" charset="0"/>
-              <a:cs typeface="Times New Roman" panose="02020603050405020304" pitchFamily="18" charset="0"/>
-            </a:endParaRPr>
-          </a:p>
-          <a:p>
-            <a:endParaRPr lang="en-US" sz="3600" baseline="-25000" dirty="0">
-              <a:latin typeface="Times New Roman" panose="02020603050405020304" pitchFamily="18" charset="0"/>
-              <a:cs typeface="Times New Roman" panose="02020603050405020304" pitchFamily="18" charset="0"/>
-            </a:endParaRPr>
-          </a:p>
-          <a:p>
-            <a:pPr algn="ctr"/>
-            <a:endParaRPr lang="en-US" sz="3600" baseline="-25000" dirty="0">
-              <a:latin typeface="Times New Roman" panose="02020603050405020304" pitchFamily="18" charset="0"/>
-              <a:cs typeface="Times New Roman" panose="02020603050405020304" pitchFamily="18" charset="0"/>
-            </a:endParaRPr>
-          </a:p>
-          <a:p>
-            <a:pPr marL="571500" indent="-571500">
-              <a:buFont typeface="Arial" panose="020B0604020202020204" pitchFamily="34" charset="0"/>
-              <a:buChar char="•"/>
-            </a:pPr>
-            <a:endParaRPr lang="en-US" sz="3600" baseline="-25000" dirty="0">
-              <a:latin typeface="Times New Roman" panose="02020603050405020304" pitchFamily="18" charset="0"/>
-              <a:cs typeface="Times New Roman" panose="02020603050405020304" pitchFamily="18" charset="0"/>
-            </a:endParaRPr>
-          </a:p>
-          <a:p>
-            <a:pPr marL="571500" indent="-571500">
-              <a:buFont typeface="Arial" panose="020B0604020202020204" pitchFamily="34" charset="0"/>
-              <a:buChar char="•"/>
-            </a:pPr>
-            <a:endParaRPr lang="en-US" sz="3600" baseline="-25000" dirty="0">
-              <a:latin typeface="Times New Roman" panose="02020603050405020304" pitchFamily="18" charset="0"/>
-              <a:cs typeface="Times New Roman" panose="02020603050405020304" pitchFamily="18" charset="0"/>
-            </a:endParaRPr>
-          </a:p>
-          <a:p>
-            <a:pPr marL="571500" indent="-571500">
-              <a:buFont typeface="Arial" panose="020B0604020202020204" pitchFamily="34" charset="0"/>
-              <a:buChar char="•"/>
-            </a:pPr>
-            <a:endParaRPr lang="en-US" sz="3600" baseline="-25000" dirty="0">
-              <a:latin typeface="Times New Roman" panose="02020603050405020304" pitchFamily="18" charset="0"/>
-              <a:cs typeface="Times New Roman" panose="02020603050405020304" pitchFamily="18" charset="0"/>
-            </a:endParaRPr>
-          </a:p>
-        </p:txBody>
-      </p:sp>
-      <p:pic>
-        <p:nvPicPr>
-          <p:cNvPr id="9" name="Picture 8">
-            <a:extLst>
-              <a:ext uri="{FF2B5EF4-FFF2-40B4-BE49-F238E27FC236}">
-                <a16:creationId xmlns:a16="http://schemas.microsoft.com/office/drawing/2014/main" id="{D4F462A0-084F-49B5-8B6D-83F9395CA455}"/>
-              </a:ext>
-            </a:extLst>
-          </p:cNvPr>
-          <p:cNvPicPr>
-            <a:picLocks noChangeAspect="1"/>
-          </p:cNvPicPr>
-          <p:nvPr/>
-        </p:nvPicPr>
-        <p:blipFill>
-          <a:blip r:embed="rId7"/>
-          <a:stretch>
-            <a:fillRect/>
-          </a:stretch>
-        </p:blipFill>
-        <p:spPr>
-          <a:xfrm>
-            <a:off x="14456288" y="7033712"/>
-            <a:ext cx="8945580" cy="5163542"/>
-          </a:xfrm>
-          <a:prstGeom prst="rect">
-            <a:avLst/>
-          </a:prstGeom>
-        </p:spPr>
-      </p:pic>
-      <p:sp>
-        <p:nvSpPr>
-          <p:cNvPr id="13" name="TextBox 12">
-            <a:extLst>
-              <a:ext uri="{FF2B5EF4-FFF2-40B4-BE49-F238E27FC236}">
-                <a16:creationId xmlns:a16="http://schemas.microsoft.com/office/drawing/2014/main" id="{B44E22C5-437A-43DE-915F-0E90AC667EB6}"/>
-              </a:ext>
-            </a:extLst>
-          </p:cNvPr>
-          <p:cNvSpPr txBox="1"/>
-          <p:nvPr/>
-        </p:nvSpPr>
-        <p:spPr>
-          <a:xfrm>
-            <a:off x="13089825" y="12314217"/>
-            <a:ext cx="11972773" cy="523220"/>
-          </a:xfrm>
-          <a:prstGeom prst="rect">
-            <a:avLst/>
-          </a:prstGeom>
-          <a:noFill/>
-        </p:spPr>
-        <p:txBody>
-          <a:bodyPr wrap="square" rtlCol="0">
-            <a:spAutoFit/>
-          </a:bodyPr>
-          <a:lstStyle/>
-          <a:p>
-            <a:r>
-              <a:rPr lang="en-US" sz="1400" dirty="0">
-                <a:latin typeface="Times New Roman" panose="02020603050405020304" pitchFamily="18" charset="0"/>
-                <a:cs typeface="Times New Roman" panose="02020603050405020304" pitchFamily="18" charset="0"/>
-              </a:rPr>
-              <a:t>Figure 4: Table of known energy levels for the first ten ionization states of all the lanthanides and actinides. Note that 2 known energy levels only include 0 and a theoretical max, so no experimental data exists for these values.</a:t>
-            </a:r>
-          </a:p>
-        </p:txBody>
-      </p:sp>
-      <p:pic>
-        <p:nvPicPr>
-          <p:cNvPr id="16" name="Picture 15">
-            <a:extLst>
-              <a:ext uri="{FF2B5EF4-FFF2-40B4-BE49-F238E27FC236}">
-                <a16:creationId xmlns:a16="http://schemas.microsoft.com/office/drawing/2014/main" id="{B013BD3A-482D-42E1-94E8-C5413446BB23}"/>
-              </a:ext>
-            </a:extLst>
-          </p:cNvPr>
-          <p:cNvPicPr>
-            <a:picLocks noChangeAspect="1"/>
-          </p:cNvPicPr>
-          <p:nvPr/>
-        </p:nvPicPr>
-        <p:blipFill>
-          <a:blip r:embed="rId8"/>
-          <a:stretch>
-            <a:fillRect/>
-          </a:stretch>
-        </p:blipFill>
-        <p:spPr>
-          <a:xfrm>
-            <a:off x="15875858" y="17688815"/>
-            <a:ext cx="6771075" cy="839540"/>
-          </a:xfrm>
-          <a:prstGeom prst="rect">
-            <a:avLst/>
-          </a:prstGeom>
-        </p:spPr>
-      </p:pic>
+        </p:txBody>
+      </p:sp>
       <p:pic>
         <p:nvPicPr>
           <p:cNvPr id="17" name="Picture 2">
@@ -5477,7 +5319,7 @@
           <p:nvPr/>
         </p:nvPicPr>
         <p:blipFill>
-          <a:blip r:embed="rId9">
+          <a:blip r:embed="rId7">
             <a:extLst>
               <a:ext uri="{28A0092B-C50C-407E-A947-70E740481C1C}">
                 <a14:useLocalDpi xmlns:a14="http://schemas.microsoft.com/office/drawing/2010/main" val="0"/>
@@ -5491,7 +5333,7 @@
         </p:blipFill>
         <p:spPr bwMode="auto">
           <a:xfrm>
-            <a:off x="15594202" y="18945076"/>
+            <a:off x="13036553" y="8982794"/>
             <a:ext cx="6964017" cy="4743606"/>
           </a:xfrm>
           <a:prstGeom prst="rect">
@@ -5509,6 +5351,671 @@
           </a:extLst>
         </p:spPr>
       </p:pic>
+      <p:sp>
+        <p:nvSpPr>
+          <p:cNvPr id="2" name="TextBox 1">
+            <a:extLst>
+              <a:ext uri="{FF2B5EF4-FFF2-40B4-BE49-F238E27FC236}">
+                <a16:creationId xmlns:a16="http://schemas.microsoft.com/office/drawing/2014/main" id="{2D4D356B-4CC1-4655-8EB6-E88861D0089B}"/>
+              </a:ext>
+            </a:extLst>
+          </p:cNvPr>
+          <p:cNvSpPr txBox="1"/>
+          <p:nvPr/>
+        </p:nvSpPr>
+        <p:spPr>
+          <a:xfrm>
+            <a:off x="20000570" y="9369438"/>
+            <a:ext cx="4729852" cy="3970318"/>
+          </a:xfrm>
+          <a:prstGeom prst="rect">
+            <a:avLst/>
+          </a:prstGeom>
+          <a:noFill/>
+        </p:spPr>
+        <p:txBody>
+          <a:bodyPr wrap="square" rtlCol="0">
+            <a:spAutoFit/>
+          </a:bodyPr>
+          <a:lstStyle/>
+          <a:p>
+            <a:r>
+              <a:rPr lang="en-US" dirty="0">
+                <a:latin typeface="Times New Roman" panose="02020603050405020304" pitchFamily="18" charset="0"/>
+                <a:cs typeface="Times New Roman" panose="02020603050405020304" pitchFamily="18" charset="0"/>
+              </a:rPr>
+              <a:t>Equation 1: The Saha equation (top) is the backbone of all the ionization state abundance calculations. Y</a:t>
+            </a:r>
+            <a:r>
+              <a:rPr lang="en-US" baseline="-25000" dirty="0">
+                <a:latin typeface="Times New Roman" panose="02020603050405020304" pitchFamily="18" charset="0"/>
+                <a:cs typeface="Times New Roman" panose="02020603050405020304" pitchFamily="18" charset="0"/>
+              </a:rPr>
+              <a:t>Z,I+1</a:t>
+            </a:r>
+            <a:r>
+              <a:rPr lang="en-US" dirty="0">
+                <a:latin typeface="Times New Roman" panose="02020603050405020304" pitchFamily="18" charset="0"/>
+                <a:cs typeface="Times New Roman" panose="02020603050405020304" pitchFamily="18" charset="0"/>
+              </a:rPr>
+              <a:t>/Y</a:t>
+            </a:r>
+            <a:r>
+              <a:rPr lang="en-US" baseline="-25000" dirty="0">
+                <a:latin typeface="Times New Roman" panose="02020603050405020304" pitchFamily="18" charset="0"/>
+                <a:cs typeface="Times New Roman" panose="02020603050405020304" pitchFamily="18" charset="0"/>
+              </a:rPr>
+              <a:t>Z</a:t>
+            </a:r>
+            <a:r>
+              <a:rPr lang="en-US" dirty="0">
+                <a:latin typeface="Times New Roman" panose="02020603050405020304" pitchFamily="18" charset="0"/>
+                <a:cs typeface="Times New Roman" panose="02020603050405020304" pitchFamily="18" charset="0"/>
+              </a:rPr>
+              <a:t> refers to the ratio of the Z+1 ionization state abundance to the </a:t>
+            </a:r>
+            <a:r>
+              <a:rPr lang="en-US" dirty="0" err="1">
+                <a:latin typeface="Times New Roman" panose="02020603050405020304" pitchFamily="18" charset="0"/>
+                <a:cs typeface="Times New Roman" panose="02020603050405020304" pitchFamily="18" charset="0"/>
+              </a:rPr>
+              <a:t>Zth</a:t>
+            </a:r>
+            <a:r>
+              <a:rPr lang="en-US" dirty="0">
+                <a:latin typeface="Times New Roman" panose="02020603050405020304" pitchFamily="18" charset="0"/>
+                <a:cs typeface="Times New Roman" panose="02020603050405020304" pitchFamily="18" charset="0"/>
+              </a:rPr>
+              <a:t> ionization state abundance. </a:t>
+            </a:r>
+            <a:r>
+              <a:rPr lang="en-US" dirty="0" err="1">
+                <a:latin typeface="Times New Roman" panose="02020603050405020304" pitchFamily="18" charset="0"/>
+                <a:cs typeface="Times New Roman" panose="02020603050405020304" pitchFamily="18" charset="0"/>
+              </a:rPr>
+              <a:t>Y</a:t>
+            </a:r>
+            <a:r>
+              <a:rPr lang="en-US" baseline="-25000" dirty="0" err="1">
+                <a:latin typeface="Times New Roman" panose="02020603050405020304" pitchFamily="18" charset="0"/>
+                <a:cs typeface="Times New Roman" panose="02020603050405020304" pitchFamily="18" charset="0"/>
+              </a:rPr>
+              <a:t>e,tot</a:t>
+            </a:r>
+            <a:r>
+              <a:rPr lang="en-US" dirty="0">
+                <a:latin typeface="Times New Roman" panose="02020603050405020304" pitchFamily="18" charset="0"/>
+                <a:cs typeface="Times New Roman" panose="02020603050405020304" pitchFamily="18" charset="0"/>
+              </a:rPr>
+              <a:t> is the total electron fraction of the merger material, f is the proportion of the Y</a:t>
+            </a:r>
+            <a:r>
+              <a:rPr lang="en-US" baseline="-25000" dirty="0">
+                <a:latin typeface="Times New Roman" panose="02020603050405020304" pitchFamily="18" charset="0"/>
+                <a:cs typeface="Times New Roman" panose="02020603050405020304" pitchFamily="18" charset="0"/>
+              </a:rPr>
+              <a:t>e</a:t>
+            </a:r>
+            <a:r>
+              <a:rPr lang="en-US" dirty="0">
+                <a:latin typeface="Times New Roman" panose="02020603050405020304" pitchFamily="18" charset="0"/>
+                <a:cs typeface="Times New Roman" panose="02020603050405020304" pitchFamily="18" charset="0"/>
+              </a:rPr>
+              <a:t> that is free, and </a:t>
+            </a:r>
+            <a:r>
+              <a:rPr lang="el-GR" dirty="0">
+                <a:latin typeface="Times New Roman" panose="02020603050405020304" pitchFamily="18" charset="0"/>
+                <a:cs typeface="Times New Roman" panose="02020603050405020304" pitchFamily="18" charset="0"/>
+              </a:rPr>
+              <a:t>χ</a:t>
+            </a:r>
+            <a:r>
+              <a:rPr lang="en-US" baseline="-25000" dirty="0" err="1">
+                <a:latin typeface="Times New Roman" panose="02020603050405020304" pitchFamily="18" charset="0"/>
+                <a:cs typeface="Times New Roman" panose="02020603050405020304" pitchFamily="18" charset="0"/>
+              </a:rPr>
+              <a:t>i</a:t>
+            </a:r>
+            <a:r>
+              <a:rPr lang="en-US" baseline="-25000" dirty="0">
+                <a:latin typeface="Times New Roman" panose="02020603050405020304" pitchFamily="18" charset="0"/>
+                <a:cs typeface="Times New Roman" panose="02020603050405020304" pitchFamily="18" charset="0"/>
+              </a:rPr>
+              <a:t> </a:t>
+            </a:r>
+            <a:r>
+              <a:rPr lang="en-US" dirty="0">
+                <a:latin typeface="Times New Roman" panose="02020603050405020304" pitchFamily="18" charset="0"/>
+                <a:cs typeface="Times New Roman" panose="02020603050405020304" pitchFamily="18" charset="0"/>
+              </a:rPr>
+              <a:t>is the ionization potential of the </a:t>
+            </a:r>
+            <a:r>
+              <a:rPr lang="en-US" dirty="0" err="1">
+                <a:latin typeface="Times New Roman" panose="02020603050405020304" pitchFamily="18" charset="0"/>
+                <a:cs typeface="Times New Roman" panose="02020603050405020304" pitchFamily="18" charset="0"/>
+              </a:rPr>
+              <a:t>ith</a:t>
+            </a:r>
+            <a:r>
+              <a:rPr lang="en-US" dirty="0">
+                <a:latin typeface="Times New Roman" panose="02020603050405020304" pitchFamily="18" charset="0"/>
+                <a:cs typeface="Times New Roman" panose="02020603050405020304" pitchFamily="18" charset="0"/>
+              </a:rPr>
+              <a:t> ionization state</a:t>
+            </a:r>
+          </a:p>
+          <a:p>
+            <a:endParaRPr lang="en-US" dirty="0">
+              <a:latin typeface="Times New Roman" panose="02020603050405020304" pitchFamily="18" charset="0"/>
+              <a:cs typeface="Times New Roman" panose="02020603050405020304" pitchFamily="18" charset="0"/>
+            </a:endParaRPr>
+          </a:p>
+          <a:p>
+            <a:r>
+              <a:rPr lang="en-US" dirty="0">
+                <a:latin typeface="Times New Roman" panose="02020603050405020304" pitchFamily="18" charset="0"/>
+                <a:cs typeface="Times New Roman" panose="02020603050405020304" pitchFamily="18" charset="0"/>
+              </a:rPr>
+              <a:t>Figure 4: Plot of samarium abundance over time (left) based on output from Skynet. Note that the abundances at early times is noise considering there are values lower than 10</a:t>
+            </a:r>
+            <a:r>
+              <a:rPr lang="en-US" baseline="30000" dirty="0">
+                <a:latin typeface="Times New Roman" panose="02020603050405020304" pitchFamily="18" charset="0"/>
+                <a:cs typeface="Times New Roman" panose="02020603050405020304" pitchFamily="18" charset="0"/>
+              </a:rPr>
+              <a:t>-20</a:t>
+            </a:r>
+            <a:r>
+              <a:rPr lang="en-US" dirty="0">
+                <a:latin typeface="Times New Roman" panose="02020603050405020304" pitchFamily="18" charset="0"/>
+                <a:cs typeface="Times New Roman" panose="02020603050405020304" pitchFamily="18" charset="0"/>
+              </a:rPr>
+              <a:t>. Values become important around 10</a:t>
+            </a:r>
+            <a:r>
+              <a:rPr lang="en-US" baseline="30000" dirty="0">
+                <a:latin typeface="Times New Roman" panose="02020603050405020304" pitchFamily="18" charset="0"/>
+                <a:cs typeface="Times New Roman" panose="02020603050405020304" pitchFamily="18" charset="0"/>
+              </a:rPr>
+              <a:t>-1 </a:t>
+            </a:r>
+            <a:r>
+              <a:rPr lang="en-US" dirty="0">
+                <a:latin typeface="Times New Roman" panose="02020603050405020304" pitchFamily="18" charset="0"/>
+                <a:cs typeface="Times New Roman" panose="02020603050405020304" pitchFamily="18" charset="0"/>
+              </a:rPr>
+              <a:t>sec.</a:t>
+            </a:r>
+            <a:r>
+              <a:rPr lang="en-US" baseline="30000" dirty="0">
+                <a:latin typeface="Times New Roman" panose="02020603050405020304" pitchFamily="18" charset="0"/>
+                <a:cs typeface="Times New Roman" panose="02020603050405020304" pitchFamily="18" charset="0"/>
+              </a:rPr>
+              <a:t> </a:t>
+            </a:r>
+            <a:endParaRPr lang="en-US" dirty="0">
+              <a:latin typeface="Times New Roman" panose="02020603050405020304" pitchFamily="18" charset="0"/>
+              <a:cs typeface="Times New Roman" panose="02020603050405020304" pitchFamily="18" charset="0"/>
+            </a:endParaRPr>
+          </a:p>
+        </p:txBody>
+      </p:sp>
+      <p:pic>
+        <p:nvPicPr>
+          <p:cNvPr id="3" name="Picture 2">
+            <a:extLst>
+              <a:ext uri="{FF2B5EF4-FFF2-40B4-BE49-F238E27FC236}">
+                <a16:creationId xmlns:a16="http://schemas.microsoft.com/office/drawing/2014/main" id="{D8C9A236-8C9B-49A0-82F9-32EC5A2EB277}"/>
+              </a:ext>
+            </a:extLst>
+          </p:cNvPr>
+          <p:cNvPicPr>
+            <a:picLocks noChangeAspect="1"/>
+          </p:cNvPicPr>
+          <p:nvPr/>
+        </p:nvPicPr>
+        <p:blipFill>
+          <a:blip r:embed="rId8"/>
+          <a:stretch>
+            <a:fillRect/>
+          </a:stretch>
+        </p:blipFill>
+        <p:spPr>
+          <a:xfrm>
+            <a:off x="16149156" y="8013754"/>
+            <a:ext cx="8080306" cy="923857"/>
+          </a:xfrm>
+          <a:prstGeom prst="rect">
+            <a:avLst/>
+          </a:prstGeom>
+        </p:spPr>
+      </p:pic>
+      <p:pic>
+        <p:nvPicPr>
+          <p:cNvPr id="6" name="Picture 5">
+            <a:extLst>
+              <a:ext uri="{FF2B5EF4-FFF2-40B4-BE49-F238E27FC236}">
+                <a16:creationId xmlns:a16="http://schemas.microsoft.com/office/drawing/2014/main" id="{0FECE4D8-4F56-4F8F-8EA8-3838150F9CC4}"/>
+              </a:ext>
+            </a:extLst>
+          </p:cNvPr>
+          <p:cNvPicPr>
+            <a:picLocks noChangeAspect="1"/>
+          </p:cNvPicPr>
+          <p:nvPr/>
+        </p:nvPicPr>
+        <p:blipFill>
+          <a:blip r:embed="rId9"/>
+          <a:stretch>
+            <a:fillRect/>
+          </a:stretch>
+        </p:blipFill>
+        <p:spPr>
+          <a:xfrm>
+            <a:off x="12746401" y="20002265"/>
+            <a:ext cx="5846399" cy="4202629"/>
+          </a:xfrm>
+          <a:prstGeom prst="rect">
+            <a:avLst/>
+          </a:prstGeom>
+        </p:spPr>
+      </p:pic>
+      <p:sp>
+        <p:nvSpPr>
+          <p:cNvPr id="16" name="TextBox 15">
+            <a:extLst>
+              <a:ext uri="{FF2B5EF4-FFF2-40B4-BE49-F238E27FC236}">
+                <a16:creationId xmlns:a16="http://schemas.microsoft.com/office/drawing/2014/main" id="{AC09FDE7-D737-4E67-90DD-9B0CC5216A0F}"/>
+              </a:ext>
+            </a:extLst>
+          </p:cNvPr>
+          <p:cNvSpPr txBox="1"/>
+          <p:nvPr/>
+        </p:nvSpPr>
+        <p:spPr>
+          <a:xfrm>
+            <a:off x="26025993" y="2880216"/>
+            <a:ext cx="10502894" cy="7848302"/>
+          </a:xfrm>
+          <a:prstGeom prst="rect">
+            <a:avLst/>
+          </a:prstGeom>
+          <a:noFill/>
+        </p:spPr>
+        <p:txBody>
+          <a:bodyPr wrap="square" rtlCol="0">
+            <a:spAutoFit/>
+          </a:bodyPr>
+          <a:lstStyle/>
+          <a:p>
+            <a:pPr algn="ctr"/>
+            <a:r>
+              <a:rPr lang="en-US" sz="5400" b="1" baseline="-25000" dirty="0">
+                <a:solidFill>
+                  <a:srgbClr val="FF0000"/>
+                </a:solidFill>
+                <a:latin typeface="Times New Roman" panose="02020603050405020304" pitchFamily="18" charset="0"/>
+                <a:cs typeface="Times New Roman" panose="02020603050405020304" pitchFamily="18" charset="0"/>
+              </a:rPr>
+              <a:t>Conclusion</a:t>
+            </a:r>
+          </a:p>
+          <a:p>
+            <a:r>
+              <a:rPr lang="en-US" sz="3600" baseline="-25000" dirty="0">
+                <a:latin typeface="Times New Roman" panose="02020603050405020304" pitchFamily="18" charset="0"/>
+                <a:cs typeface="Times New Roman" panose="02020603050405020304" pitchFamily="18" charset="0"/>
+              </a:rPr>
+              <a:t>Based on our analysis of the abundance graphs </a:t>
+            </a:r>
+          </a:p>
+          <a:p>
+            <a:endParaRPr lang="en-US" sz="3600" baseline="-25000" dirty="0">
+              <a:latin typeface="Times New Roman" panose="02020603050405020304" pitchFamily="18" charset="0"/>
+              <a:cs typeface="Times New Roman" panose="02020603050405020304" pitchFamily="18" charset="0"/>
+            </a:endParaRPr>
+          </a:p>
+          <a:p>
+            <a:endParaRPr lang="en-US" sz="3600" baseline="-25000" dirty="0">
+              <a:latin typeface="Times New Roman" panose="02020603050405020304" pitchFamily="18" charset="0"/>
+              <a:cs typeface="Times New Roman" panose="02020603050405020304" pitchFamily="18" charset="0"/>
+            </a:endParaRPr>
+          </a:p>
+          <a:p>
+            <a:pPr marL="571500" indent="-571500">
+              <a:buFont typeface="Arial" panose="020B0604020202020204" pitchFamily="34" charset="0"/>
+              <a:buChar char="•"/>
+            </a:pPr>
+            <a:endParaRPr lang="en-US" sz="3600" baseline="-25000" dirty="0">
+              <a:latin typeface="Times New Roman" panose="02020603050405020304" pitchFamily="18" charset="0"/>
+              <a:cs typeface="Times New Roman" panose="02020603050405020304" pitchFamily="18" charset="0"/>
+            </a:endParaRPr>
+          </a:p>
+          <a:p>
+            <a:pPr marL="571500" indent="-571500">
+              <a:buFont typeface="Arial" panose="020B0604020202020204" pitchFamily="34" charset="0"/>
+              <a:buChar char="•"/>
+            </a:pPr>
+            <a:endParaRPr lang="en-US" sz="3600" baseline="-25000" dirty="0">
+              <a:latin typeface="Times New Roman" panose="02020603050405020304" pitchFamily="18" charset="0"/>
+              <a:cs typeface="Times New Roman" panose="02020603050405020304" pitchFamily="18" charset="0"/>
+            </a:endParaRPr>
+          </a:p>
+          <a:p>
+            <a:pPr marL="571500" indent="-571500">
+              <a:buFont typeface="Arial" panose="020B0604020202020204" pitchFamily="34" charset="0"/>
+              <a:buChar char="•"/>
+            </a:pPr>
+            <a:endParaRPr lang="en-US" sz="3600" baseline="-25000" dirty="0">
+              <a:latin typeface="Times New Roman" panose="02020603050405020304" pitchFamily="18" charset="0"/>
+              <a:cs typeface="Times New Roman" panose="02020603050405020304" pitchFamily="18" charset="0"/>
+            </a:endParaRPr>
+          </a:p>
+          <a:p>
+            <a:pPr marL="571500" indent="-571500">
+              <a:buFont typeface="Arial" panose="020B0604020202020204" pitchFamily="34" charset="0"/>
+              <a:buChar char="•"/>
+            </a:pPr>
+            <a:endParaRPr lang="en-US" sz="3600" baseline="-25000" dirty="0">
+              <a:latin typeface="Times New Roman" panose="02020603050405020304" pitchFamily="18" charset="0"/>
+              <a:cs typeface="Times New Roman" panose="02020603050405020304" pitchFamily="18" charset="0"/>
+            </a:endParaRPr>
+          </a:p>
+          <a:p>
+            <a:pPr marL="571500" indent="-571500">
+              <a:buFont typeface="Arial" panose="020B0604020202020204" pitchFamily="34" charset="0"/>
+              <a:buChar char="•"/>
+            </a:pPr>
+            <a:endParaRPr lang="en-US" sz="3600" baseline="-25000" dirty="0">
+              <a:latin typeface="Times New Roman" panose="02020603050405020304" pitchFamily="18" charset="0"/>
+              <a:cs typeface="Times New Roman" panose="02020603050405020304" pitchFamily="18" charset="0"/>
+            </a:endParaRPr>
+          </a:p>
+          <a:p>
+            <a:pPr marL="571500" indent="-571500">
+              <a:buFont typeface="Arial" panose="020B0604020202020204" pitchFamily="34" charset="0"/>
+              <a:buChar char="•"/>
+            </a:pPr>
+            <a:endParaRPr lang="en-US" sz="3600" baseline="-25000" dirty="0">
+              <a:latin typeface="Times New Roman" panose="02020603050405020304" pitchFamily="18" charset="0"/>
+              <a:cs typeface="Times New Roman" panose="02020603050405020304" pitchFamily="18" charset="0"/>
+            </a:endParaRPr>
+          </a:p>
+          <a:p>
+            <a:pPr marL="571500" indent="-571500">
+              <a:buFont typeface="Arial" panose="020B0604020202020204" pitchFamily="34" charset="0"/>
+              <a:buChar char="•"/>
+            </a:pPr>
+            <a:endParaRPr lang="en-US" sz="3600" baseline="-25000" dirty="0">
+              <a:latin typeface="Times New Roman" panose="02020603050405020304" pitchFamily="18" charset="0"/>
+              <a:cs typeface="Times New Roman" panose="02020603050405020304" pitchFamily="18" charset="0"/>
+            </a:endParaRPr>
+          </a:p>
+          <a:p>
+            <a:pPr marL="571500" indent="-571500">
+              <a:buFont typeface="Arial" panose="020B0604020202020204" pitchFamily="34" charset="0"/>
+              <a:buChar char="•"/>
+            </a:pPr>
+            <a:endParaRPr lang="en-US" sz="3600" baseline="-25000" dirty="0">
+              <a:latin typeface="Times New Roman" panose="02020603050405020304" pitchFamily="18" charset="0"/>
+              <a:cs typeface="Times New Roman" panose="02020603050405020304" pitchFamily="18" charset="0"/>
+            </a:endParaRPr>
+          </a:p>
+          <a:p>
+            <a:pPr marL="571500" indent="-571500">
+              <a:buFont typeface="Arial" panose="020B0604020202020204" pitchFamily="34" charset="0"/>
+              <a:buChar char="•"/>
+            </a:pPr>
+            <a:endParaRPr lang="en-US" sz="3600" baseline="-25000" dirty="0">
+              <a:latin typeface="Times New Roman" panose="02020603050405020304" pitchFamily="18" charset="0"/>
+              <a:cs typeface="Times New Roman" panose="02020603050405020304" pitchFamily="18" charset="0"/>
+            </a:endParaRPr>
+          </a:p>
+          <a:p>
+            <a:pPr marL="571500" indent="-571500">
+              <a:buFont typeface="Arial" panose="020B0604020202020204" pitchFamily="34" charset="0"/>
+              <a:buChar char="•"/>
+            </a:pPr>
+            <a:endParaRPr lang="en-US" sz="3600" baseline="-25000" dirty="0">
+              <a:latin typeface="Times New Roman" panose="02020603050405020304" pitchFamily="18" charset="0"/>
+              <a:cs typeface="Times New Roman" panose="02020603050405020304" pitchFamily="18" charset="0"/>
+            </a:endParaRPr>
+          </a:p>
+          <a:p>
+            <a:endParaRPr lang="en-US" sz="3600" baseline="-25000" dirty="0">
+              <a:latin typeface="Times New Roman" panose="02020603050405020304" pitchFamily="18" charset="0"/>
+              <a:cs typeface="Times New Roman" panose="02020603050405020304" pitchFamily="18" charset="0"/>
+            </a:endParaRPr>
+          </a:p>
+          <a:p>
+            <a:endParaRPr lang="en-US" sz="3600" baseline="-25000" dirty="0">
+              <a:latin typeface="Times New Roman" panose="02020603050405020304" pitchFamily="18" charset="0"/>
+              <a:cs typeface="Times New Roman" panose="02020603050405020304" pitchFamily="18" charset="0"/>
+            </a:endParaRPr>
+          </a:p>
+          <a:p>
+            <a:pPr algn="ctr"/>
+            <a:endParaRPr lang="en-US" sz="3600" baseline="-25000" dirty="0">
+              <a:latin typeface="Times New Roman" panose="02020603050405020304" pitchFamily="18" charset="0"/>
+              <a:cs typeface="Times New Roman" panose="02020603050405020304" pitchFamily="18" charset="0"/>
+            </a:endParaRPr>
+          </a:p>
+          <a:p>
+            <a:pPr marL="571500" indent="-571500">
+              <a:buFont typeface="Arial" panose="020B0604020202020204" pitchFamily="34" charset="0"/>
+              <a:buChar char="•"/>
+            </a:pPr>
+            <a:endParaRPr lang="en-US" sz="3600" baseline="-25000" dirty="0">
+              <a:latin typeface="Times New Roman" panose="02020603050405020304" pitchFamily="18" charset="0"/>
+              <a:cs typeface="Times New Roman" panose="02020603050405020304" pitchFamily="18" charset="0"/>
+            </a:endParaRPr>
+          </a:p>
+          <a:p>
+            <a:pPr marL="571500" indent="-571500">
+              <a:buFont typeface="Arial" panose="020B0604020202020204" pitchFamily="34" charset="0"/>
+              <a:buChar char="•"/>
+            </a:pPr>
+            <a:endParaRPr lang="en-US" sz="3600" baseline="-25000" dirty="0">
+              <a:latin typeface="Times New Roman" panose="02020603050405020304" pitchFamily="18" charset="0"/>
+              <a:cs typeface="Times New Roman" panose="02020603050405020304" pitchFamily="18" charset="0"/>
+            </a:endParaRPr>
+          </a:p>
+          <a:p>
+            <a:pPr marL="571500" indent="-571500">
+              <a:buFont typeface="Arial" panose="020B0604020202020204" pitchFamily="34" charset="0"/>
+              <a:buChar char="•"/>
+            </a:pPr>
+            <a:endParaRPr lang="en-US" sz="3600" baseline="-25000" dirty="0">
+              <a:latin typeface="Times New Roman" panose="02020603050405020304" pitchFamily="18" charset="0"/>
+              <a:cs typeface="Times New Roman" panose="02020603050405020304" pitchFamily="18" charset="0"/>
+            </a:endParaRPr>
+          </a:p>
+        </p:txBody>
+      </p:sp>
+      <p:cxnSp>
+        <p:nvCxnSpPr>
+          <p:cNvPr id="9" name="Straight Connector 8">
+            <a:extLst>
+              <a:ext uri="{FF2B5EF4-FFF2-40B4-BE49-F238E27FC236}">
+                <a16:creationId xmlns:a16="http://schemas.microsoft.com/office/drawing/2014/main" id="{CF8D2ACB-208F-44D9-83A4-080D535ACF57}"/>
+              </a:ext>
+            </a:extLst>
+          </p:cNvPr>
+          <p:cNvCxnSpPr>
+            <a:cxnSpLocks/>
+          </p:cNvCxnSpPr>
+          <p:nvPr/>
+        </p:nvCxnSpPr>
+        <p:spPr>
+          <a:xfrm>
+            <a:off x="12610934" y="2880216"/>
+            <a:ext cx="0" cy="23061651"/>
+          </a:xfrm>
+          <a:prstGeom prst="line">
+            <a:avLst/>
+          </a:prstGeom>
+        </p:spPr>
+        <p:style>
+          <a:lnRef idx="1">
+            <a:schemeClr val="accent1"/>
+          </a:lnRef>
+          <a:fillRef idx="0">
+            <a:schemeClr val="accent1"/>
+          </a:fillRef>
+          <a:effectRef idx="0">
+            <a:schemeClr val="accent1"/>
+          </a:effectRef>
+          <a:fontRef idx="minor">
+            <a:schemeClr val="tx1"/>
+          </a:fontRef>
+        </p:style>
+      </p:cxnSp>
+      <p:cxnSp>
+        <p:nvCxnSpPr>
+          <p:cNvPr id="23" name="Straight Connector 22">
+            <a:extLst>
+              <a:ext uri="{FF2B5EF4-FFF2-40B4-BE49-F238E27FC236}">
+                <a16:creationId xmlns:a16="http://schemas.microsoft.com/office/drawing/2014/main" id="{17EBDBB5-7180-4373-B027-ED89D036666D}"/>
+              </a:ext>
+            </a:extLst>
+          </p:cNvPr>
+          <p:cNvCxnSpPr>
+            <a:cxnSpLocks/>
+          </p:cNvCxnSpPr>
+          <p:nvPr/>
+        </p:nvCxnSpPr>
+        <p:spPr>
+          <a:xfrm>
+            <a:off x="25486241" y="2880216"/>
+            <a:ext cx="0" cy="23061651"/>
+          </a:xfrm>
+          <a:prstGeom prst="line">
+            <a:avLst/>
+          </a:prstGeom>
+        </p:spPr>
+        <p:style>
+          <a:lnRef idx="1">
+            <a:schemeClr val="accent1"/>
+          </a:lnRef>
+          <a:fillRef idx="0">
+            <a:schemeClr val="accent1"/>
+          </a:fillRef>
+          <a:effectRef idx="0">
+            <a:schemeClr val="accent1"/>
+          </a:effectRef>
+          <a:fontRef idx="minor">
+            <a:schemeClr val="tx1"/>
+          </a:fontRef>
+        </p:style>
+      </p:cxnSp>
+      <p:pic>
+        <p:nvPicPr>
+          <p:cNvPr id="22" name="Picture 21">
+            <a:extLst>
+              <a:ext uri="{FF2B5EF4-FFF2-40B4-BE49-F238E27FC236}">
+                <a16:creationId xmlns:a16="http://schemas.microsoft.com/office/drawing/2014/main" id="{808058FC-250E-4E8D-B2D4-D7AFE8C7D134}"/>
+              </a:ext>
+            </a:extLst>
+          </p:cNvPr>
+          <p:cNvPicPr>
+            <a:picLocks noChangeAspect="1"/>
+          </p:cNvPicPr>
+          <p:nvPr/>
+        </p:nvPicPr>
+        <p:blipFill>
+          <a:blip r:embed="rId10"/>
+          <a:stretch>
+            <a:fillRect/>
+          </a:stretch>
+        </p:blipFill>
+        <p:spPr>
+          <a:xfrm>
+            <a:off x="18879428" y="19762995"/>
+            <a:ext cx="6487230" cy="4322691"/>
+          </a:xfrm>
+          <a:prstGeom prst="rect">
+            <a:avLst/>
+          </a:prstGeom>
+        </p:spPr>
+      </p:pic>
+      <p:sp>
+        <p:nvSpPr>
+          <p:cNvPr id="26" name="TextBox 25">
+            <a:extLst>
+              <a:ext uri="{FF2B5EF4-FFF2-40B4-BE49-F238E27FC236}">
+                <a16:creationId xmlns:a16="http://schemas.microsoft.com/office/drawing/2014/main" id="{4870773C-BAEE-46B4-925D-E2508788D90C}"/>
+              </a:ext>
+            </a:extLst>
+          </p:cNvPr>
+          <p:cNvSpPr txBox="1"/>
+          <p:nvPr/>
+        </p:nvSpPr>
+        <p:spPr>
+          <a:xfrm>
+            <a:off x="13378226" y="24565717"/>
+            <a:ext cx="5042460" cy="1169551"/>
+          </a:xfrm>
+          <a:prstGeom prst="rect">
+            <a:avLst/>
+          </a:prstGeom>
+          <a:noFill/>
+        </p:spPr>
+        <p:txBody>
+          <a:bodyPr wrap="square" rtlCol="0">
+            <a:spAutoFit/>
+          </a:bodyPr>
+          <a:lstStyle/>
+          <a:p>
+            <a:r>
+              <a:rPr lang="en-US" sz="1400" dirty="0">
+                <a:latin typeface="Times New Roman" panose="02020603050405020304" pitchFamily="18" charset="0"/>
+                <a:cs typeface="Times New Roman" panose="02020603050405020304" pitchFamily="18" charset="0"/>
+              </a:rPr>
+              <a:t>Figure 5: Relative abundance graph of Samarium(Z=62) as a function of temperature in the merger material. It is relative to the total abundance of the element at any given time. The numerous colors represent the different ionization state abundances, where the blue at low temperatures/late times is for the fully neutral state.  </a:t>
+            </a:r>
+          </a:p>
+        </p:txBody>
+      </p:sp>
+      <p:sp>
+        <p:nvSpPr>
+          <p:cNvPr id="27" name="TextBox 26">
+            <a:extLst>
+              <a:ext uri="{FF2B5EF4-FFF2-40B4-BE49-F238E27FC236}">
+                <a16:creationId xmlns:a16="http://schemas.microsoft.com/office/drawing/2014/main" id="{54485A24-5562-4509-B8D4-274DD71D17E5}"/>
+              </a:ext>
+            </a:extLst>
+          </p:cNvPr>
+          <p:cNvSpPr txBox="1"/>
+          <p:nvPr/>
+        </p:nvSpPr>
+        <p:spPr>
+          <a:xfrm>
+            <a:off x="18879428" y="24551784"/>
+            <a:ext cx="5042460" cy="1169551"/>
+          </a:xfrm>
+          <a:prstGeom prst="rect">
+            <a:avLst/>
+          </a:prstGeom>
+          <a:noFill/>
+        </p:spPr>
+        <p:txBody>
+          <a:bodyPr wrap="square" rtlCol="0">
+            <a:spAutoFit/>
+          </a:bodyPr>
+          <a:lstStyle/>
+          <a:p>
+            <a:r>
+              <a:rPr lang="en-US" sz="1400" dirty="0">
+                <a:latin typeface="Times New Roman" panose="02020603050405020304" pitchFamily="18" charset="0"/>
+                <a:cs typeface="Times New Roman" panose="02020603050405020304" pitchFamily="18" charset="0"/>
+              </a:rPr>
+              <a:t>Figure 6: Relative abundance graph of all the lanthanides’ isoelectronic state abundances as a function of temperature  in the merger material. The various colors represent the unique isoelectronic states and the first 10 to 12 isoelectronic states are dominant at cool temperatures. </a:t>
+            </a:r>
+          </a:p>
+        </p:txBody>
+      </p:sp>
     </p:spTree>
   </p:cSld>
   <p:clrMapOvr>

</xml_diff>